<commit_message>
adding mergesort sample and some old architecture diagrams
</commit_message>
<xml_diff>
--- a/doc/diagram/diagram_v1.pptx
+++ b/doc/diagram/diagram_v1.pptx
@@ -288,7 +288,7 @@
           <a:p>
             <a:fld id="{CD86B40F-6AFA-43BE-8F62-EE1D88F29CFF}" type="datetimeFigureOut">
               <a:rPr lang="en-US" smtClean="0"/>
-              <a:t>2/18/2012</a:t>
+              <a:t>2/20/2012</a:t>
             </a:fld>
             <a:endParaRPr lang="en-US"/>
           </a:p>
@@ -458,7 +458,7 @@
           <a:p>
             <a:fld id="{CD86B40F-6AFA-43BE-8F62-EE1D88F29CFF}" type="datetimeFigureOut">
               <a:rPr lang="en-US" smtClean="0"/>
-              <a:t>2/18/2012</a:t>
+              <a:t>2/20/2012</a:t>
             </a:fld>
             <a:endParaRPr lang="en-US"/>
           </a:p>
@@ -638,7 +638,7 @@
           <a:p>
             <a:fld id="{CD86B40F-6AFA-43BE-8F62-EE1D88F29CFF}" type="datetimeFigureOut">
               <a:rPr lang="en-US" smtClean="0"/>
-              <a:t>2/18/2012</a:t>
+              <a:t>2/20/2012</a:t>
             </a:fld>
             <a:endParaRPr lang="en-US"/>
           </a:p>
@@ -808,7 +808,7 @@
           <a:p>
             <a:fld id="{CD86B40F-6AFA-43BE-8F62-EE1D88F29CFF}" type="datetimeFigureOut">
               <a:rPr lang="en-US" smtClean="0"/>
-              <a:t>2/18/2012</a:t>
+              <a:t>2/20/2012</a:t>
             </a:fld>
             <a:endParaRPr lang="en-US"/>
           </a:p>
@@ -1054,7 +1054,7 @@
           <a:p>
             <a:fld id="{CD86B40F-6AFA-43BE-8F62-EE1D88F29CFF}" type="datetimeFigureOut">
               <a:rPr lang="en-US" smtClean="0"/>
-              <a:t>2/18/2012</a:t>
+              <a:t>2/20/2012</a:t>
             </a:fld>
             <a:endParaRPr lang="en-US"/>
           </a:p>
@@ -1342,7 +1342,7 @@
           <a:p>
             <a:fld id="{CD86B40F-6AFA-43BE-8F62-EE1D88F29CFF}" type="datetimeFigureOut">
               <a:rPr lang="en-US" smtClean="0"/>
-              <a:t>2/18/2012</a:t>
+              <a:t>2/20/2012</a:t>
             </a:fld>
             <a:endParaRPr lang="en-US"/>
           </a:p>
@@ -1764,7 +1764,7 @@
           <a:p>
             <a:fld id="{CD86B40F-6AFA-43BE-8F62-EE1D88F29CFF}" type="datetimeFigureOut">
               <a:rPr lang="en-US" smtClean="0"/>
-              <a:t>2/18/2012</a:t>
+              <a:t>2/20/2012</a:t>
             </a:fld>
             <a:endParaRPr lang="en-US"/>
           </a:p>
@@ -1882,7 +1882,7 @@
           <a:p>
             <a:fld id="{CD86B40F-6AFA-43BE-8F62-EE1D88F29CFF}" type="datetimeFigureOut">
               <a:rPr lang="en-US" smtClean="0"/>
-              <a:t>2/18/2012</a:t>
+              <a:t>2/20/2012</a:t>
             </a:fld>
             <a:endParaRPr lang="en-US"/>
           </a:p>
@@ -1977,7 +1977,7 @@
           <a:p>
             <a:fld id="{CD86B40F-6AFA-43BE-8F62-EE1D88F29CFF}" type="datetimeFigureOut">
               <a:rPr lang="en-US" smtClean="0"/>
-              <a:t>2/18/2012</a:t>
+              <a:t>2/20/2012</a:t>
             </a:fld>
             <a:endParaRPr lang="en-US"/>
           </a:p>
@@ -2254,7 +2254,7 @@
           <a:p>
             <a:fld id="{CD86B40F-6AFA-43BE-8F62-EE1D88F29CFF}" type="datetimeFigureOut">
               <a:rPr lang="en-US" smtClean="0"/>
-              <a:t>2/18/2012</a:t>
+              <a:t>2/20/2012</a:t>
             </a:fld>
             <a:endParaRPr lang="en-US"/>
           </a:p>
@@ -2507,7 +2507,7 @@
           <a:p>
             <a:fld id="{CD86B40F-6AFA-43BE-8F62-EE1D88F29CFF}" type="datetimeFigureOut">
               <a:rPr lang="en-US" smtClean="0"/>
-              <a:t>2/18/2012</a:t>
+              <a:t>2/20/2012</a:t>
             </a:fld>
             <a:endParaRPr lang="en-US"/>
           </a:p>
@@ -2720,7 +2720,7 @@
           <a:p>
             <a:fld id="{CD86B40F-6AFA-43BE-8F62-EE1D88F29CFF}" type="datetimeFigureOut">
               <a:rPr lang="en-US" smtClean="0"/>
-              <a:t>2/18/2012</a:t>
+              <a:t>2/20/2012</a:t>
             </a:fld>
             <a:endParaRPr lang="en-US"/>
           </a:p>
@@ -3097,7 +3097,7 @@
       </p:grpSpPr>
       <p:grpSp>
         <p:nvGrpSpPr>
-          <p:cNvPr id="129" name="Group 128"/>
+          <p:cNvPr id="3" name="Group 2"/>
           <p:cNvGrpSpPr/>
           <p:nvPr/>
         </p:nvGrpSpPr>
@@ -3128,9 +3128,7 @@
             </a:prstGeom>
             <a:ln w="28575">
               <a:solidFill>
-                <a:schemeClr val="accent5">
-                  <a:lumMod val="75000"/>
-                </a:schemeClr>
+                <a:schemeClr val="tx1"/>
               </a:solidFill>
               <a:tailEnd type="arrow"/>
             </a:ln>
@@ -3284,7 +3282,7 @@
           </p:nvSpPr>
           <p:spPr>
             <a:xfrm>
-              <a:off x="1988820" y="2396490"/>
+              <a:off x="1988820" y="796290"/>
               <a:ext cx="903556" cy="457200"/>
             </a:xfrm>
             <a:prstGeom prst="ellipse">
@@ -5710,13 +5708,13 @@
             <p:cNvPr id="66" name="Straight Arrow Connector 65"/>
             <p:cNvCxnSpPr>
               <a:stCxn id="9" idx="6"/>
-              <a:endCxn id="6" idx="1"/>
+              <a:endCxn id="4" idx="1"/>
             </p:cNvCxnSpPr>
             <p:nvPr/>
           </p:nvCxnSpPr>
           <p:spPr>
             <a:xfrm>
-              <a:off x="2892376" y="2625090"/>
+              <a:off x="2892376" y="1024890"/>
               <a:ext cx="308024" cy="0"/>
             </a:xfrm>
             <a:prstGeom prst="straightConnector1">
@@ -5724,47 +5722,7 @@
             </a:prstGeom>
             <a:ln w="28575">
               <a:solidFill>
-                <a:schemeClr val="accent5">
-                  <a:lumMod val="75000"/>
-                </a:schemeClr>
-              </a:solidFill>
-              <a:tailEnd type="arrow"/>
-            </a:ln>
-          </p:spPr>
-          <p:style>
-            <a:lnRef idx="1">
-              <a:schemeClr val="accent1"/>
-            </a:lnRef>
-            <a:fillRef idx="0">
-              <a:schemeClr val="accent1"/>
-            </a:fillRef>
-            <a:effectRef idx="0">
-              <a:schemeClr val="accent1"/>
-            </a:effectRef>
-            <a:fontRef idx="minor">
-              <a:schemeClr val="tx1"/>
-            </a:fontRef>
-          </p:style>
-        </p:cxnSp>
-        <p:cxnSp>
-          <p:nvCxnSpPr>
-            <p:cNvPr id="69" name="Straight Arrow Connector 68"/>
-            <p:cNvCxnSpPr/>
-            <p:nvPr/>
-          </p:nvCxnSpPr>
-          <p:spPr>
-            <a:xfrm flipH="1">
-              <a:off x="3600976" y="2727960"/>
-              <a:ext cx="1" cy="426720"/>
-            </a:xfrm>
-            <a:prstGeom prst="straightConnector1">
-              <a:avLst/>
-            </a:prstGeom>
-            <a:ln w="28575">
-              <a:solidFill>
-                <a:schemeClr val="accent5">
-                  <a:lumMod val="75000"/>
-                </a:schemeClr>
+                <a:schemeClr val="tx1"/>
               </a:solidFill>
               <a:tailEnd type="arrow"/>
             </a:ln>
@@ -5877,7 +5835,7 @@
           </p:nvSpPr>
           <p:spPr>
             <a:xfrm>
-              <a:off x="2567940" y="4529824"/>
+              <a:off x="2567940" y="4326624"/>
               <a:ext cx="632460" cy="369332"/>
             </a:xfrm>
             <a:prstGeom prst="rect">
@@ -5893,22 +5851,10 @@
             <a:p>
               <a:pPr algn="r"/>
               <a:r>
-                <a:rPr lang="en-US" b="1" dirty="0" smtClean="0">
-                  <a:solidFill>
-                    <a:schemeClr val="accent5">
-                      <a:lumMod val="75000"/>
-                    </a:schemeClr>
-                  </a:solidFill>
-                </a:rPr>
+                <a:rPr lang="en-US" b="1" dirty="0" smtClean="0"/>
                 <a:t>Map</a:t>
               </a:r>
-              <a:endParaRPr lang="en-US" b="1" dirty="0">
-                <a:solidFill>
-                  <a:schemeClr val="accent5">
-                    <a:lumMod val="75000"/>
-                  </a:schemeClr>
-                </a:solidFill>
-              </a:endParaRPr>
+              <a:endParaRPr lang="en-US" b="1" dirty="0"/>
             </a:p>
           </p:txBody>
         </p:sp>
@@ -5931,9 +5877,7 @@
             </a:prstGeom>
             <a:ln w="28575">
               <a:solidFill>
-                <a:schemeClr val="accent5">
-                  <a:lumMod val="75000"/>
-                </a:schemeClr>
+                <a:schemeClr val="tx1"/>
               </a:solidFill>
               <a:tailEnd type="arrow"/>
             </a:ln>
@@ -5972,9 +5916,7 @@
             </a:prstGeom>
             <a:ln w="28575">
               <a:solidFill>
-                <a:schemeClr val="accent5">
-                  <a:lumMod val="75000"/>
-                </a:schemeClr>
+                <a:schemeClr val="tx1"/>
               </a:solidFill>
               <a:tailEnd type="arrow"/>
             </a:ln>
@@ -6013,9 +5955,7 @@
             </a:prstGeom>
             <a:ln w="28575">
               <a:solidFill>
-                <a:schemeClr val="accent5">
-                  <a:lumMod val="75000"/>
-                </a:schemeClr>
+                <a:schemeClr val="tx1"/>
               </a:solidFill>
               <a:tailEnd type="arrow"/>
             </a:ln>
@@ -6127,9 +6067,7 @@
             </a:prstGeom>
             <a:ln w="28575">
               <a:solidFill>
-                <a:schemeClr val="accent5">
-                  <a:lumMod val="75000"/>
-                </a:schemeClr>
+                <a:schemeClr val="tx1"/>
               </a:solidFill>
               <a:tailEnd type="arrow"/>
             </a:ln>
@@ -6167,9 +6105,7 @@
             </a:prstGeom>
             <a:ln w="28575">
               <a:solidFill>
-                <a:schemeClr val="accent5">
-                  <a:lumMod val="75000"/>
-                </a:schemeClr>
+                <a:schemeClr val="tx1"/>
               </a:solidFill>
               <a:tailEnd type="arrow"/>
             </a:ln>
@@ -6207,9 +6143,7 @@
             </a:prstGeom>
             <a:ln w="28575">
               <a:solidFill>
-                <a:schemeClr val="accent5">
-                  <a:lumMod val="75000"/>
-                </a:schemeClr>
+                <a:schemeClr val="tx1"/>
               </a:solidFill>
               <a:tailEnd type="arrow"/>
             </a:ln>
@@ -6247,9 +6181,7 @@
             </a:prstGeom>
             <a:ln w="28575">
               <a:solidFill>
-                <a:schemeClr val="accent5">
-                  <a:lumMod val="75000"/>
-                </a:schemeClr>
+                <a:schemeClr val="tx1"/>
               </a:solidFill>
               <a:tailEnd type="arrow"/>
             </a:ln>
@@ -6277,7 +6209,7 @@
           </p:nvSpPr>
           <p:spPr>
             <a:xfrm>
-              <a:off x="2422769" y="5372013"/>
+              <a:off x="2206869" y="4762413"/>
               <a:ext cx="993531" cy="369332"/>
             </a:xfrm>
             <a:prstGeom prst="rect">
@@ -6293,22 +6225,10 @@
             <a:p>
               <a:pPr algn="r"/>
               <a:r>
-                <a:rPr lang="en-US" b="1" dirty="0" smtClean="0">
-                  <a:solidFill>
-                    <a:schemeClr val="accent5">
-                      <a:lumMod val="75000"/>
-                    </a:schemeClr>
-                  </a:solidFill>
-                </a:rPr>
+                <a:rPr lang="en-US" b="1" dirty="0" smtClean="0"/>
                 <a:t>Reduce</a:t>
               </a:r>
-              <a:endParaRPr lang="en-US" b="1" dirty="0">
-                <a:solidFill>
-                  <a:schemeClr val="accent5">
-                    <a:lumMod val="75000"/>
-                  </a:schemeClr>
-                </a:solidFill>
-              </a:endParaRPr>
+              <a:endParaRPr lang="en-US" b="1" dirty="0"/>
             </a:p>
           </p:txBody>
         </p:sp>

</xml_diff>